<commit_message>
Avances en página de título: Listo fondo blaco específico, faltan franjas de colores y eslogan. Queda pendiente también asignar los colores de las fuentes en términos de la paleta oficial.
</commit_message>
<xml_diff>
--- a/2020.02.03_Presentacion_Modelo4_Amarillo.pptx
+++ b/2020.02.03_Presentacion_Modelo4_Amarillo.pptx
@@ -114,7 +114,7 @@
   </p:defaultTextStyle>
   <p:extLst>
     <p:ext uri="{EFAFB233-063F-42B5-8137-9DF3F51BA10A}">
-      <p15:sldGuideLst xmlns="" xmlns:p15="http://schemas.microsoft.com/office/powerpoint/2012/main">
+      <p15:sldGuideLst xmlns:p15="http://schemas.microsoft.com/office/powerpoint/2012/main">
         <p15:guide id="1" orient="horz" pos="2160">
           <p15:clr>
             <a:srgbClr val="A4A3A4"/>
@@ -132,7 +132,7 @@
 </file>
 
 <file path=ppt/charts/chart1.xml><?xml version="1.0" encoding="utf-8"?>
-<c:chartSpace xmlns:c="http://schemas.openxmlformats.org/drawingml/2006/chart" xmlns:a="http://schemas.openxmlformats.org/drawingml/2006/main" xmlns:r="http://schemas.openxmlformats.org/officeDocument/2006/relationships">
+<c:chartSpace xmlns:c="http://schemas.openxmlformats.org/drawingml/2006/chart" xmlns:a="http://schemas.openxmlformats.org/drawingml/2006/main" xmlns:r="http://schemas.openxmlformats.org/officeDocument/2006/relationships" xmlns:c16r2="http://schemas.microsoft.com/office/drawing/2015/06/chart">
   <c:date1904 val="0"/>
   <c:lang val="es-ES"/>
   <c:roundedCorners val="0"/>
@@ -173,7 +173,6 @@
           </a:p>
         </c:rich>
       </c:tx>
-      <c:layout/>
       <c:overlay val="0"/>
     </c:title>
     <c:autoTitleDeleted val="0"/>
@@ -211,7 +210,7 @@
                 <a:noFill/>
               </a:ln>
             </c:spPr>
-            <c:extLst xmlns:c16r2="http://schemas.microsoft.com/office/drawing/2015/06/chart">
+            <c:extLst>
               <c:ext xmlns:c16="http://schemas.microsoft.com/office/drawing/2014/chart" uri="{C3380CC4-5D6E-409C-BE32-E72D297353CC}">
                 <c16:uniqueId val="{00000001-E26F-4A11-960E-12B2D56E840D}"/>
               </c:ext>
@@ -228,7 +227,7 @@
                 <a:noFill/>
               </a:ln>
             </c:spPr>
-            <c:extLst xmlns:c16r2="http://schemas.microsoft.com/office/drawing/2015/06/chart">
+            <c:extLst>
               <c:ext xmlns:c16="http://schemas.microsoft.com/office/drawing/2014/chart" uri="{C3380CC4-5D6E-409C-BE32-E72D297353CC}">
                 <c16:uniqueId val="{00000003-E26F-4A11-960E-12B2D56E840D}"/>
               </c:ext>
@@ -245,7 +244,7 @@
                 <a:noFill/>
               </a:ln>
             </c:spPr>
-            <c:extLst xmlns:c16r2="http://schemas.microsoft.com/office/drawing/2015/06/chart">
+            <c:extLst>
               <c:ext xmlns:c16="http://schemas.microsoft.com/office/drawing/2014/chart" uri="{C3380CC4-5D6E-409C-BE32-E72D297353CC}">
                 <c16:uniqueId val="{00000005-E26F-4A11-960E-12B2D56E840D}"/>
               </c:ext>
@@ -262,7 +261,7 @@
                 <a:noFill/>
               </a:ln>
             </c:spPr>
-            <c:extLst xmlns:c16r2="http://schemas.microsoft.com/office/drawing/2015/06/chart">
+            <c:extLst>
               <c:ext xmlns:c16="http://schemas.microsoft.com/office/drawing/2014/chart" uri="{C3380CC4-5D6E-409C-BE32-E72D297353CC}">
                 <c16:uniqueId val="{00000007-E26F-4A11-960E-12B2D56E840D}"/>
               </c:ext>
@@ -283,7 +282,7 @@
               <c:showSerName val="0"/>
               <c:showPercent val="1"/>
               <c:showBubbleSize val="0"/>
-              <c:extLst xmlns:c16r2="http://schemas.microsoft.com/office/drawing/2015/06/chart">
+              <c:extLst>
                 <c:ext xmlns:c15="http://schemas.microsoft.com/office/drawing/2012/chart" uri="{CE6537A1-D6FC-4f65-9D91-7224C49458BB}"/>
                 <c:ext xmlns:c16="http://schemas.microsoft.com/office/drawing/2014/chart" uri="{C3380CC4-5D6E-409C-BE32-E72D297353CC}">
                   <c16:uniqueId val="{00000001-E26F-4A11-960E-12B2D56E840D}"/>
@@ -294,8 +293,8 @@
               <c:idx val="1"/>
               <c:layout>
                 <c:manualLayout>
-                  <c:x val="-0.11860239682681"/>
-                  <c:y val="0.151647017121689"/>
+                  <c:x val="-0.11860239682680999"/>
+                  <c:y val="0.15164701712168899"/>
                 </c:manualLayout>
               </c:layout>
               <c:showLegendKey val="0"/>
@@ -304,7 +303,7 @@
               <c:showSerName val="0"/>
               <c:showPercent val="1"/>
               <c:showBubbleSize val="0"/>
-              <c:extLst xmlns:c16r2="http://schemas.microsoft.com/office/drawing/2015/06/chart">
+              <c:extLst>
                 <c:ext xmlns:c15="http://schemas.microsoft.com/office/drawing/2012/chart" uri="{CE6537A1-D6FC-4f65-9D91-7224C49458BB}"/>
                 <c:ext xmlns:c16="http://schemas.microsoft.com/office/drawing/2014/chart" uri="{C3380CC4-5D6E-409C-BE32-E72D297353CC}">
                   <c16:uniqueId val="{00000003-E26F-4A11-960E-12B2D56E840D}"/>
@@ -316,7 +315,7 @@
               <c:layout>
                 <c:manualLayout>
                   <c:x val="-0.173950182012655"/>
-                  <c:y val="-0.0659014107975685"/>
+                  <c:y val="-6.5901410797568505E-2"/>
                 </c:manualLayout>
               </c:layout>
               <c:showLegendKey val="0"/>
@@ -325,7 +324,7 @@
               <c:showSerName val="0"/>
               <c:showPercent val="1"/>
               <c:showBubbleSize val="0"/>
-              <c:extLst xmlns:c16r2="http://schemas.microsoft.com/office/drawing/2015/06/chart">
+              <c:extLst>
                 <c:ext xmlns:c15="http://schemas.microsoft.com/office/drawing/2012/chart" uri="{CE6537A1-D6FC-4f65-9D91-7224C49458BB}"/>
                 <c:ext xmlns:c16="http://schemas.microsoft.com/office/drawing/2014/chart" uri="{C3380CC4-5D6E-409C-BE32-E72D297353CC}">
                   <c16:uniqueId val="{00000005-E26F-4A11-960E-12B2D56E840D}"/>
@@ -336,8 +335,8 @@
               <c:idx val="3"/>
               <c:layout>
                 <c:manualLayout>
-                  <c:x val="-0.0474409587307241"/>
-                  <c:y val="-0.120819253128876"/>
+                  <c:x val="-4.7440958730724098E-2"/>
+                  <c:y val="-0.12081925312887599"/>
                 </c:manualLayout>
               </c:layout>
               <c:showLegendKey val="0"/>
@@ -346,7 +345,7 @@
               <c:showSerName val="0"/>
               <c:showPercent val="1"/>
               <c:showBubbleSize val="0"/>
-              <c:extLst xmlns:c16r2="http://schemas.microsoft.com/office/drawing/2015/06/chart">
+              <c:extLst>
                 <c:ext xmlns:c15="http://schemas.microsoft.com/office/drawing/2012/chart" uri="{CE6537A1-D6FC-4f65-9D91-7224C49458BB}"/>
                 <c:ext xmlns:c16="http://schemas.microsoft.com/office/drawing/2014/chart" uri="{C3380CC4-5D6E-409C-BE32-E72D297353CC}">
                   <c16:uniqueId val="{00000007-E26F-4A11-960E-12B2D56E840D}"/>
@@ -373,7 +372,7 @@
                     <a:cs typeface="Ancizar Sans Black"/>
                   </a:defRPr>
                 </a:pPr>
-                <a:endParaRPr lang="es-ES"/>
+                <a:endParaRPr lang="es-CO"/>
               </a:p>
             </c:txPr>
             <c:showLegendKey val="0"/>
@@ -383,7 +382,7 @@
             <c:showPercent val="1"/>
             <c:showBubbleSize val="0"/>
             <c:showLeaderLines val="1"/>
-            <c:extLst xmlns:c16r2="http://schemas.microsoft.com/office/drawing/2015/06/chart">
+            <c:extLst>
               <c:ext xmlns:c15="http://schemas.microsoft.com/office/drawing/2012/chart" uri="{CE6537A1-D6FC-4f65-9D91-7224C49458BB}"/>
             </c:extLst>
           </c:dLbls>
@@ -414,7 +413,7 @@
                 <c:formatCode>General</c:formatCode>
                 <c:ptCount val="4"/>
                 <c:pt idx="0">
-                  <c:v>8.200000000000001</c:v>
+                  <c:v>8.2000000000000011</c:v>
                 </c:pt>
                 <c:pt idx="1">
                   <c:v>3.2</c:v>
@@ -428,7 +427,7 @@
               </c:numCache>
             </c:numRef>
           </c:val>
-          <c:extLst xmlns:c16r2="http://schemas.microsoft.com/office/drawing/2015/06/chart">
+          <c:extLst>
             <c:ext xmlns:c16="http://schemas.microsoft.com/office/drawing/2014/chart" uri="{C3380CC4-5D6E-409C-BE32-E72D297353CC}">
               <c16:uniqueId val="{00000008-E26F-4A11-960E-12B2D56E840D}"/>
             </c:ext>
@@ -453,10 +452,10 @@
         <c:manualLayout>
           <c:xMode val="edge"/>
           <c:yMode val="edge"/>
-          <c:x val="0.0460466801601537"/>
+          <c:x val="4.6046680160153702E-2"/>
           <c:y val="0.142448384061028"/>
-          <c:w val="0.899999813224572"/>
-          <c:h val="0.0525199927775545"/>
+          <c:w val="0.89999981322457201"/>
+          <c:h val="5.2519992777554501E-2"/>
         </c:manualLayout>
       </c:layout>
       <c:overlay val="0"/>
@@ -471,7 +470,7 @@
               </a:solidFill>
             </a:defRPr>
           </a:pPr>
-          <a:endParaRPr lang="es-ES"/>
+          <a:endParaRPr lang="es-CO"/>
         </a:p>
       </c:txPr>
     </c:legend>
@@ -497,7 +496,7 @@
           <a:cs typeface="Ancizar Sans"/>
         </a:defRPr>
       </a:pPr>
-      <a:endParaRPr lang="es-ES"/>
+      <a:endParaRPr lang="es-CO"/>
     </a:p>
   </c:txPr>
   <c:externalData r:id="rId1">
@@ -687,7 +686,7 @@
           <a:p>
             <a:fld id="{892DB89D-5D07-394E-9E68-0DA793DAC88A}" type="datetimeFigureOut">
               <a:rPr lang="es-ES" smtClean="0"/>
-              <a:t>3/02/20</a:t>
+              <a:t>21/05/2021</a:t>
             </a:fld>
             <a:endParaRPr lang="es-ES"/>
           </a:p>
@@ -729,7 +728,7 @@
           <a:p>
             <a:fld id="{90BC2BA4-81C0-F544-BD72-C8CB9DA7C802}" type="slidenum">
               <a:rPr lang="es-ES" smtClean="0"/>
-              <a:t>‹Nr.›</a:t>
+              <a:t>‹Nº›</a:t>
             </a:fld>
             <a:endParaRPr lang="es-ES"/>
           </a:p>
@@ -857,7 +856,7 @@
           <a:p>
             <a:fld id="{892DB89D-5D07-394E-9E68-0DA793DAC88A}" type="datetimeFigureOut">
               <a:rPr lang="es-ES" smtClean="0"/>
-              <a:t>3/02/20</a:t>
+              <a:t>21/05/2021</a:t>
             </a:fld>
             <a:endParaRPr lang="es-ES"/>
           </a:p>
@@ -899,7 +898,7 @@
           <a:p>
             <a:fld id="{90BC2BA4-81C0-F544-BD72-C8CB9DA7C802}" type="slidenum">
               <a:rPr lang="es-ES" smtClean="0"/>
-              <a:t>‹Nr.›</a:t>
+              <a:t>‹Nº›</a:t>
             </a:fld>
             <a:endParaRPr lang="es-ES"/>
           </a:p>
@@ -1037,7 +1036,7 @@
           <a:p>
             <a:fld id="{892DB89D-5D07-394E-9E68-0DA793DAC88A}" type="datetimeFigureOut">
               <a:rPr lang="es-ES" smtClean="0"/>
-              <a:t>3/02/20</a:t>
+              <a:t>21/05/2021</a:t>
             </a:fld>
             <a:endParaRPr lang="es-ES"/>
           </a:p>
@@ -1079,7 +1078,7 @@
           <a:p>
             <a:fld id="{90BC2BA4-81C0-F544-BD72-C8CB9DA7C802}" type="slidenum">
               <a:rPr lang="es-ES" smtClean="0"/>
-              <a:t>‹Nr.›</a:t>
+              <a:t>‹Nº›</a:t>
             </a:fld>
             <a:endParaRPr lang="es-ES"/>
           </a:p>
@@ -1207,7 +1206,7 @@
           <a:p>
             <a:fld id="{892DB89D-5D07-394E-9E68-0DA793DAC88A}" type="datetimeFigureOut">
               <a:rPr lang="es-ES" smtClean="0"/>
-              <a:t>3/02/20</a:t>
+              <a:t>21/05/2021</a:t>
             </a:fld>
             <a:endParaRPr lang="es-ES"/>
           </a:p>
@@ -1249,7 +1248,7 @@
           <a:p>
             <a:fld id="{90BC2BA4-81C0-F544-BD72-C8CB9DA7C802}" type="slidenum">
               <a:rPr lang="es-ES" smtClean="0"/>
-              <a:t>‹Nr.›</a:t>
+              <a:t>‹Nº›</a:t>
             </a:fld>
             <a:endParaRPr lang="es-ES"/>
           </a:p>
@@ -1453,7 +1452,7 @@
           <a:p>
             <a:fld id="{892DB89D-5D07-394E-9E68-0DA793DAC88A}" type="datetimeFigureOut">
               <a:rPr lang="es-ES" smtClean="0"/>
-              <a:t>3/02/20</a:t>
+              <a:t>21/05/2021</a:t>
             </a:fld>
             <a:endParaRPr lang="es-ES"/>
           </a:p>
@@ -1495,7 +1494,7 @@
           <a:p>
             <a:fld id="{90BC2BA4-81C0-F544-BD72-C8CB9DA7C802}" type="slidenum">
               <a:rPr lang="es-ES" smtClean="0"/>
-              <a:t>‹Nr.›</a:t>
+              <a:t>‹Nº›</a:t>
             </a:fld>
             <a:endParaRPr lang="es-ES"/>
           </a:p>
@@ -1741,7 +1740,7 @@
           <a:p>
             <a:fld id="{892DB89D-5D07-394E-9E68-0DA793DAC88A}" type="datetimeFigureOut">
               <a:rPr lang="es-ES" smtClean="0"/>
-              <a:t>3/02/20</a:t>
+              <a:t>21/05/2021</a:t>
             </a:fld>
             <a:endParaRPr lang="es-ES"/>
           </a:p>
@@ -1783,7 +1782,7 @@
           <a:p>
             <a:fld id="{90BC2BA4-81C0-F544-BD72-C8CB9DA7C802}" type="slidenum">
               <a:rPr lang="es-ES" smtClean="0"/>
-              <a:t>‹Nr.›</a:t>
+              <a:t>‹Nº›</a:t>
             </a:fld>
             <a:endParaRPr lang="es-ES"/>
           </a:p>
@@ -2163,7 +2162,7 @@
           <a:p>
             <a:fld id="{892DB89D-5D07-394E-9E68-0DA793DAC88A}" type="datetimeFigureOut">
               <a:rPr lang="es-ES" smtClean="0"/>
-              <a:t>3/02/20</a:t>
+              <a:t>21/05/2021</a:t>
             </a:fld>
             <a:endParaRPr lang="es-ES"/>
           </a:p>
@@ -2205,7 +2204,7 @@
           <a:p>
             <a:fld id="{90BC2BA4-81C0-F544-BD72-C8CB9DA7C802}" type="slidenum">
               <a:rPr lang="es-ES" smtClean="0"/>
-              <a:t>‹Nr.›</a:t>
+              <a:t>‹Nº›</a:t>
             </a:fld>
             <a:endParaRPr lang="es-ES"/>
           </a:p>
@@ -2281,7 +2280,7 @@
           <a:p>
             <a:fld id="{892DB89D-5D07-394E-9E68-0DA793DAC88A}" type="datetimeFigureOut">
               <a:rPr lang="es-ES" smtClean="0"/>
-              <a:t>3/02/20</a:t>
+              <a:t>21/05/2021</a:t>
             </a:fld>
             <a:endParaRPr lang="es-ES"/>
           </a:p>
@@ -2323,7 +2322,7 @@
           <a:p>
             <a:fld id="{90BC2BA4-81C0-F544-BD72-C8CB9DA7C802}" type="slidenum">
               <a:rPr lang="es-ES" smtClean="0"/>
-              <a:t>‹Nr.›</a:t>
+              <a:t>‹Nº›</a:t>
             </a:fld>
             <a:endParaRPr lang="es-ES"/>
           </a:p>
@@ -2376,7 +2375,7 @@
           <a:p>
             <a:fld id="{892DB89D-5D07-394E-9E68-0DA793DAC88A}" type="datetimeFigureOut">
               <a:rPr lang="es-ES" smtClean="0"/>
-              <a:t>3/02/20</a:t>
+              <a:t>21/05/2021</a:t>
             </a:fld>
             <a:endParaRPr lang="es-ES"/>
           </a:p>
@@ -2418,7 +2417,7 @@
           <a:p>
             <a:fld id="{90BC2BA4-81C0-F544-BD72-C8CB9DA7C802}" type="slidenum">
               <a:rPr lang="es-ES" smtClean="0"/>
-              <a:t>‹Nr.›</a:t>
+              <a:t>‹Nº›</a:t>
             </a:fld>
             <a:endParaRPr lang="es-ES"/>
           </a:p>
@@ -2653,7 +2652,7 @@
           <a:p>
             <a:fld id="{892DB89D-5D07-394E-9E68-0DA793DAC88A}" type="datetimeFigureOut">
               <a:rPr lang="es-ES" smtClean="0"/>
-              <a:t>3/02/20</a:t>
+              <a:t>21/05/2021</a:t>
             </a:fld>
             <a:endParaRPr lang="es-ES"/>
           </a:p>
@@ -2695,7 +2694,7 @@
           <a:p>
             <a:fld id="{90BC2BA4-81C0-F544-BD72-C8CB9DA7C802}" type="slidenum">
               <a:rPr lang="es-ES" smtClean="0"/>
-              <a:t>‹Nr.›</a:t>
+              <a:t>‹Nº›</a:t>
             </a:fld>
             <a:endParaRPr lang="es-ES"/>
           </a:p>
@@ -2910,7 +2909,7 @@
           <a:p>
             <a:fld id="{892DB89D-5D07-394E-9E68-0DA793DAC88A}" type="datetimeFigureOut">
               <a:rPr lang="es-ES" smtClean="0"/>
-              <a:t>3/02/20</a:t>
+              <a:t>21/05/2021</a:t>
             </a:fld>
             <a:endParaRPr lang="es-ES"/>
           </a:p>
@@ -2952,7 +2951,7 @@
           <a:p>
             <a:fld id="{90BC2BA4-81C0-F544-BD72-C8CB9DA7C802}" type="slidenum">
               <a:rPr lang="es-ES" smtClean="0"/>
-              <a:t>‹Nr.›</a:t>
+              <a:t>‹Nº›</a:t>
             </a:fld>
             <a:endParaRPr lang="es-ES"/>
           </a:p>
@@ -3130,7 +3129,7 @@
           <a:p>
             <a:fld id="{892DB89D-5D07-394E-9E68-0DA793DAC88A}" type="datetimeFigureOut">
               <a:rPr lang="es-ES" smtClean="0"/>
-              <a:t>3/02/20</a:t>
+              <a:t>21/05/2021</a:t>
             </a:fld>
             <a:endParaRPr lang="es-ES"/>
           </a:p>
@@ -3208,7 +3207,7 @@
           <a:p>
             <a:fld id="{90BC2BA4-81C0-F544-BD72-C8CB9DA7C802}" type="slidenum">
               <a:rPr lang="es-ES" smtClean="0"/>
-              <a:t>‹Nr.›</a:t>
+              <a:t>‹Nº›</a:t>
             </a:fld>
             <a:endParaRPr lang="es-ES"/>
           </a:p>
@@ -3670,7 +3669,7 @@
         <p:spPr>
           <a:xfrm>
             <a:off x="2796651" y="2936138"/>
-            <a:ext cx="3546477" cy="369332"/>
+            <a:ext cx="3868100" cy="369332"/>
           </a:xfrm>
           <a:prstGeom prst="rect">
             <a:avLst/>
@@ -3999,28 +3998,28 @@
                 <a:gridCol w="1600916">
                   <a:extLst>
                     <a:ext uri="{9D8B030D-6E8A-4147-A177-3AD203B41FA5}">
-                      <a16:colId xmlns="" xmlns:a16="http://schemas.microsoft.com/office/drawing/2014/main" val="20000"/>
+                      <a16:colId xmlns:a16="http://schemas.microsoft.com/office/drawing/2014/main" val="20000"/>
                     </a:ext>
                   </a:extLst>
                 </a:gridCol>
                 <a:gridCol w="1153264">
                   <a:extLst>
                     <a:ext uri="{9D8B030D-6E8A-4147-A177-3AD203B41FA5}">
-                      <a16:colId xmlns="" xmlns:a16="http://schemas.microsoft.com/office/drawing/2014/main" val="20001"/>
+                      <a16:colId xmlns:a16="http://schemas.microsoft.com/office/drawing/2014/main" val="20001"/>
                     </a:ext>
                   </a:extLst>
                 </a:gridCol>
                 <a:gridCol w="1204359">
                   <a:extLst>
                     <a:ext uri="{9D8B030D-6E8A-4147-A177-3AD203B41FA5}">
-                      <a16:colId xmlns="" xmlns:a16="http://schemas.microsoft.com/office/drawing/2014/main" val="20002"/>
+                      <a16:colId xmlns:a16="http://schemas.microsoft.com/office/drawing/2014/main" val="20002"/>
                     </a:ext>
                   </a:extLst>
                 </a:gridCol>
                 <a:gridCol w="1160563">
                   <a:extLst>
                     <a:ext uri="{9D8B030D-6E8A-4147-A177-3AD203B41FA5}">
-                      <a16:colId xmlns="" xmlns:a16="http://schemas.microsoft.com/office/drawing/2014/main" val="20003"/>
+                      <a16:colId xmlns:a16="http://schemas.microsoft.com/office/drawing/2014/main" val="20003"/>
                     </a:ext>
                   </a:extLst>
                 </a:gridCol>
@@ -4315,7 +4314,7 @@
                 </a:tc>
                 <a:extLst>
                   <a:ext uri="{0D108BD9-81ED-4DB2-BD59-A6C34878D82A}">
-                    <a16:rowId xmlns="" xmlns:a16="http://schemas.microsoft.com/office/drawing/2014/main" val="10000"/>
+                    <a16:rowId xmlns:a16="http://schemas.microsoft.com/office/drawing/2014/main" val="10000"/>
                   </a:ext>
                 </a:extLst>
               </a:tr>
@@ -4579,7 +4578,7 @@
                 </a:tc>
                 <a:extLst>
                   <a:ext uri="{0D108BD9-81ED-4DB2-BD59-A6C34878D82A}">
-                    <a16:rowId xmlns="" xmlns:a16="http://schemas.microsoft.com/office/drawing/2014/main" val="10001"/>
+                    <a16:rowId xmlns:a16="http://schemas.microsoft.com/office/drawing/2014/main" val="10001"/>
                   </a:ext>
                 </a:extLst>
               </a:tr>
@@ -4867,7 +4866,7 @@
                 </a:tc>
                 <a:extLst>
                   <a:ext uri="{0D108BD9-81ED-4DB2-BD59-A6C34878D82A}">
-                    <a16:rowId xmlns="" xmlns:a16="http://schemas.microsoft.com/office/drawing/2014/main" val="10002"/>
+                    <a16:rowId xmlns:a16="http://schemas.microsoft.com/office/drawing/2014/main" val="10002"/>
                   </a:ext>
                 </a:extLst>
               </a:tr>
@@ -5139,7 +5138,7 @@
                 </a:tc>
                 <a:extLst>
                   <a:ext uri="{0D108BD9-81ED-4DB2-BD59-A6C34878D82A}">
-                    <a16:rowId xmlns="" xmlns:a16="http://schemas.microsoft.com/office/drawing/2014/main" val="10003"/>
+                    <a16:rowId xmlns:a16="http://schemas.microsoft.com/office/drawing/2014/main" val="10003"/>
                   </a:ext>
                 </a:extLst>
               </a:tr>
@@ -5411,7 +5410,7 @@
                 </a:tc>
                 <a:extLst>
                   <a:ext uri="{0D108BD9-81ED-4DB2-BD59-A6C34878D82A}">
-                    <a16:rowId xmlns="" xmlns:a16="http://schemas.microsoft.com/office/drawing/2014/main" val="10004"/>
+                    <a16:rowId xmlns:a16="http://schemas.microsoft.com/office/drawing/2014/main" val="10004"/>
                   </a:ext>
                 </a:extLst>
               </a:tr>
@@ -5683,7 +5682,7 @@
                 </a:tc>
                 <a:extLst>
                   <a:ext uri="{0D108BD9-81ED-4DB2-BD59-A6C34878D82A}">
-                    <a16:rowId xmlns="" xmlns:a16="http://schemas.microsoft.com/office/drawing/2014/main" val="10005"/>
+                    <a16:rowId xmlns:a16="http://schemas.microsoft.com/office/drawing/2014/main" val="10005"/>
                   </a:ext>
                 </a:extLst>
               </a:tr>
@@ -5987,7 +5986,7 @@
                 </a:tc>
                 <a:extLst>
                   <a:ext uri="{0D108BD9-81ED-4DB2-BD59-A6C34878D82A}">
-                    <a16:rowId xmlns="" xmlns:a16="http://schemas.microsoft.com/office/drawing/2014/main" val="10006"/>
+                    <a16:rowId xmlns:a16="http://schemas.microsoft.com/office/drawing/2014/main" val="10006"/>
                   </a:ext>
                 </a:extLst>
               </a:tr>
@@ -8452,7 +8451,7 @@
           <p:cNvPr id="18" name="1 Rectángulo">
             <a:extLst>
               <a:ext uri="{FF2B5EF4-FFF2-40B4-BE49-F238E27FC236}">
-                <a16:creationId xmlns="" xmlns:a16="http://schemas.microsoft.com/office/drawing/2014/main" id="{2214E7E6-CDE6-4D45-9D9B-9E26810060BA}"/>
+                <a16:creationId xmlns:a16="http://schemas.microsoft.com/office/drawing/2014/main" id="{2214E7E6-CDE6-4D45-9D9B-9E26810060BA}"/>
               </a:ext>
             </a:extLst>
           </p:cNvPr>
@@ -8511,7 +8510,7 @@
           <p:cNvPr id="19" name="21 Rectángulo">
             <a:extLst>
               <a:ext uri="{FF2B5EF4-FFF2-40B4-BE49-F238E27FC236}">
-                <a16:creationId xmlns="" xmlns:a16="http://schemas.microsoft.com/office/drawing/2014/main" id="{C2FD8689-5C0D-4426-8546-A3D41FB63A41}"/>
+                <a16:creationId xmlns:a16="http://schemas.microsoft.com/office/drawing/2014/main" id="{C2FD8689-5C0D-4426-8546-A3D41FB63A41}"/>
               </a:ext>
             </a:extLst>
           </p:cNvPr>

</xml_diff>